<commit_message>
Presentation: Add email extractor, topic miner usage
</commit_message>
<xml_diff>
--- a/Tutorial Presentation - Improved ExpertSearch.pptx
+++ b/Tutorial Presentation - Improved ExpertSearch.pptx
@@ -118,6 +118,11 @@
       </a:defRPr>
     </a:lvl9pPr>
   </p:defaultTextStyle>
+  <p:extLst>
+    <p:ext uri="{EFAFB233-063F-42B5-8137-9DF3F51BA10A}">
+      <p15:sldGuideLst xmlns:p15="http://schemas.microsoft.com/office/powerpoint/2012/main"/>
+    </p:ext>
+  </p:extLst>
 </p:presentation>
 </file>
 
@@ -457,7 +462,7 @@
             <a:fld id="{5923F103-BC34-4FE4-A40E-EDDEECFDA5D0}" type="datetimeFigureOut">
               <a:rPr lang="en-US" dirty="0"/>
               <a:pPr/>
-              <a:t>12/12/20</a:t>
+              <a:t>12/12/2020</a:t>
             </a:fld>
             <a:endParaRPr lang="en-US" dirty="0"/>
           </a:p>
@@ -1541,7 +1546,7 @@
           <a:p>
             <a:fld id="{923A1CC3-2375-41D4-9E03-427CAF2A4C1A}" type="datetimeFigureOut">
               <a:rPr lang="en-US" dirty="0"/>
-              <a:t>12/12/20</a:t>
+              <a:t>12/12/2020</a:t>
             </a:fld>
             <a:endParaRPr lang="en-US" dirty="0"/>
           </a:p>
@@ -2517,7 +2522,7 @@
           <a:p>
             <a:fld id="{AFF16868-8199-4C2C-A5B1-63AEE139F88E}" type="datetimeFigureOut">
               <a:rPr lang="en-US" dirty="0"/>
-              <a:t>12/12/20</a:t>
+              <a:t>12/12/2020</a:t>
             </a:fld>
             <a:endParaRPr lang="en-US" dirty="0"/>
           </a:p>
@@ -3647,7 +3652,7 @@
           <a:p>
             <a:fld id="{AAD9FF7F-6988-44CC-821B-644E70CD2F73}" type="datetimeFigureOut">
               <a:rPr lang="en-US" dirty="0"/>
-              <a:t>12/12/20</a:t>
+              <a:t>12/12/2020</a:t>
             </a:fld>
             <a:endParaRPr lang="en-US" dirty="0"/>
           </a:p>
@@ -4676,7 +4681,7 @@
           <a:p>
             <a:fld id="{5C12C299-16B2-4475-990D-751901EACC14}" type="datetimeFigureOut">
               <a:rPr lang="en-US" dirty="0"/>
-              <a:t>12/12/20</a:t>
+              <a:t>12/12/2020</a:t>
             </a:fld>
             <a:endParaRPr lang="en-US" dirty="0"/>
           </a:p>
@@ -5332,7 +5337,7 @@
           <a:p>
             <a:fld id="{9FE86839-B9D8-4651-8783-F325ECE74E65}" type="datetimeFigureOut">
               <a:rPr lang="en-US" dirty="0"/>
-              <a:t>12/12/20</a:t>
+              <a:t>12/12/2020</a:t>
             </a:fld>
             <a:endParaRPr lang="en-US" dirty="0"/>
           </a:p>
@@ -6189,7 +6194,7 @@
           <a:p>
             <a:fld id="{FD484F64-32F6-45C5-931F-ADC1662401D0}" type="datetimeFigureOut">
               <a:rPr lang="en-US" dirty="0"/>
-              <a:t>12/12/20</a:t>
+              <a:t>12/12/2020</a:t>
             </a:fld>
             <a:endParaRPr lang="en-US" dirty="0"/>
           </a:p>
@@ -6375,7 +6380,7 @@
           <a:p>
             <a:fld id="{53086D93-FCAC-47E0-A2EE-787E62CA814C}" type="datetimeFigureOut">
               <a:rPr lang="en-US" dirty="0"/>
-              <a:t>12/12/20</a:t>
+              <a:t>12/12/2020</a:t>
             </a:fld>
             <a:endParaRPr lang="en-US" dirty="0"/>
           </a:p>
@@ -7343,7 +7348,7 @@
           <a:p>
             <a:fld id="{CDA879A6-0FD0-4734-A311-86BFCA472E6E}" type="datetimeFigureOut">
               <a:rPr lang="en-US" dirty="0"/>
-              <a:t>12/12/20</a:t>
+              <a:t>12/12/2020</a:t>
             </a:fld>
             <a:endParaRPr lang="en-US" dirty="0"/>
           </a:p>
@@ -7550,7 +7555,7 @@
           <a:p>
             <a:fld id="{19C9CA7B-DFD4-44B5-8C60-D14B8CD1FB59}" type="datetimeFigureOut">
               <a:rPr lang="en-US" dirty="0"/>
-              <a:t>12/12/20</a:t>
+              <a:t>12/12/2020</a:t>
             </a:fld>
             <a:endParaRPr lang="en-US" dirty="0"/>
           </a:p>
@@ -8580,7 +8585,7 @@
           <a:p>
             <a:fld id="{F34E6425-0181-43F2-84FC-787E803FD2F8}" type="datetimeFigureOut">
               <a:rPr lang="en-US" dirty="0"/>
-              <a:t>12/12/20</a:t>
+              <a:t>12/12/2020</a:t>
             </a:fld>
             <a:endParaRPr lang="en-US" dirty="0"/>
           </a:p>
@@ -8848,7 +8853,7 @@
           <a:p>
             <a:fld id="{3BDB8791-F1B0-41E7-B7FD-A781E65C4266}" type="datetimeFigureOut">
               <a:rPr lang="en-US" dirty="0"/>
-              <a:t>12/12/20</a:t>
+              <a:t>12/12/2020</a:t>
             </a:fld>
             <a:endParaRPr lang="en-US" dirty="0"/>
           </a:p>
@@ -9254,7 +9259,7 @@
           <a:p>
             <a:fld id="{5FDD63B2-E120-4ED8-B27B-C685F510A5FE}" type="datetimeFigureOut">
               <a:rPr lang="en-US" dirty="0"/>
-              <a:t>12/12/20</a:t>
+              <a:t>12/12/2020</a:t>
             </a:fld>
             <a:endParaRPr lang="en-US" dirty="0"/>
           </a:p>
@@ -9377,7 +9382,7 @@
           <a:p>
             <a:fld id="{7AA18ACC-A947-437B-A130-35BD54FDF1E9}" type="datetimeFigureOut">
               <a:rPr lang="en-US" dirty="0"/>
-              <a:t>12/12/20</a:t>
+              <a:t>12/12/2020</a:t>
             </a:fld>
             <a:endParaRPr lang="en-US" dirty="0"/>
           </a:p>
@@ -9468,7 +9473,7 @@
           <a:p>
             <a:fld id="{7C8D7E02-BCB8-4D50-A234-369438C08659}" type="datetimeFigureOut">
               <a:rPr lang="en-US" dirty="0"/>
-              <a:t>12/12/20</a:t>
+              <a:t>12/12/2020</a:t>
             </a:fld>
             <a:endParaRPr lang="en-US" dirty="0"/>
           </a:p>
@@ -10545,7 +10550,7 @@
           <a:p>
             <a:fld id="{76E86A4C-8E40-4F87-A4F0-01A0687C5742}" type="datetimeFigureOut">
               <a:rPr lang="en-US" dirty="0"/>
-              <a:t>12/12/20</a:t>
+              <a:t>12/12/2020</a:t>
             </a:fld>
             <a:endParaRPr lang="en-US" dirty="0"/>
           </a:p>
@@ -11649,7 +11654,7 @@
           <a:p>
             <a:fld id="{35E72C73-2D91-4E12-BA25-F0AA0C03599B}" type="datetimeFigureOut">
               <a:rPr lang="en-US" dirty="0"/>
-              <a:t>12/12/20</a:t>
+              <a:t>12/12/2020</a:t>
             </a:fld>
             <a:endParaRPr lang="en-US" dirty="0"/>
           </a:p>
@@ -12642,7 +12647,7 @@
           <a:p>
             <a:fld id="{2BE451C3-0FF4-47C4-B829-773ADF60F88C}" type="datetimeFigureOut">
               <a:rPr lang="en-US" dirty="0"/>
-              <a:t>12/12/20</a:t>
+              <a:t>12/12/2020</a:t>
             </a:fld>
             <a:endParaRPr lang="en-US" dirty="0"/>
           </a:p>
@@ -13480,6 +13485,33 @@
               <a:t>Email Extraction</a:t>
             </a:r>
           </a:p>
+          <a:p>
+            <a:pPr lvl="1"/>
+            <a:r>
+              <a:rPr lang="en-US" b="1" dirty="0"/>
+              <a:t>$ cd </a:t>
+            </a:r>
+            <a:r>
+              <a:rPr lang="en-US" b="1" dirty="0" err="1"/>
+              <a:t>ExpertSearch</a:t>
+            </a:r>
+            <a:r>
+              <a:rPr lang="en-US" b="1" dirty="0"/>
+              <a:t>/extraction</a:t>
+            </a:r>
+          </a:p>
+          <a:p>
+            <a:pPr lvl="1"/>
+            <a:r>
+              <a:rPr lang="en-US" b="1" dirty="0"/>
+              <a:t>$ python extract_email.py</a:t>
+            </a:r>
+            <a:endParaRPr lang="en-US" dirty="0"/>
+          </a:p>
+          <a:p>
+            <a:pPr lvl="1"/>
+            <a:endParaRPr lang="en-US" dirty="0"/>
+          </a:p>
         </p:txBody>
       </p:sp>
       <p:sp>
@@ -15663,7 +15695,9 @@
         </p:nvSpPr>
         <p:spPr/>
         <p:txBody>
-          <a:bodyPr/>
+          <a:bodyPr>
+            <a:normAutofit lnSpcReduction="10000"/>
+          </a:bodyPr>
           <a:lstStyle/>
           <a:p>
             <a:endParaRPr lang="en-US" dirty="0"/>
@@ -15675,6 +15709,84 @@
             <a:r>
               <a:rPr lang="en-US" dirty="0"/>
               <a:t>Topic Miner</a:t>
+            </a:r>
+          </a:p>
+          <a:p>
+            <a:pPr lvl="1"/>
+            <a:r>
+              <a:rPr lang="en-US" dirty="0"/>
+              <a:t>Work in </a:t>
+            </a:r>
+            <a:r>
+              <a:rPr lang="en-US" dirty="0" err="1"/>
+              <a:t>jupyter</a:t>
+            </a:r>
+            <a:r>
+              <a:rPr lang="en-US" dirty="0"/>
+              <a:t> notebook (</a:t>
+            </a:r>
+            <a:r>
+              <a:rPr lang="en-US" dirty="0" err="1"/>
+              <a:t>ExpertSearch</a:t>
+            </a:r>
+            <a:r>
+              <a:rPr lang="en-US" dirty="0"/>
+              <a:t>/data/</a:t>
+            </a:r>
+            <a:r>
+              <a:rPr lang="en-US" dirty="0" err="1"/>
+              <a:t>expertsearch</a:t>
+            </a:r>
+            <a:r>
+              <a:rPr lang="en-US" dirty="0"/>
+              <a:t>/</a:t>
+            </a:r>
+            <a:r>
+              <a:rPr lang="en-US" dirty="0" err="1"/>
+              <a:t>LDATopicModeling.ipynb</a:t>
+            </a:r>
+            <a:r>
+              <a:rPr lang="en-US" dirty="0"/>
+              <a:t>)</a:t>
+            </a:r>
+          </a:p>
+          <a:p>
+            <a:pPr lvl="2"/>
+            <a:r>
+              <a:rPr lang="en-US" dirty="0"/>
+              <a:t>Build corpus and dictionary, and create topic model</a:t>
+            </a:r>
+          </a:p>
+          <a:p>
+            <a:pPr lvl="2"/>
+            <a:r>
+              <a:rPr lang="en-US" dirty="0"/>
+              <a:t>Manually inspect topics with high coherence</a:t>
+            </a:r>
+          </a:p>
+          <a:p>
+            <a:pPr lvl="2"/>
+            <a:r>
+              <a:rPr lang="en-US" dirty="0"/>
+              <a:t>Check against known document</a:t>
+            </a:r>
+          </a:p>
+          <a:p>
+            <a:pPr lvl="2"/>
+            <a:r>
+              <a:rPr lang="en-US"/>
+              <a:t>Save best </a:t>
+            </a:r>
+            <a:r>
+              <a:rPr lang="en-US" dirty="0"/>
+              <a:t>topic model, corpus, dictionary</a:t>
+            </a:r>
+          </a:p>
+          <a:p>
+            <a:pPr lvl="1"/>
+            <a:r>
+              <a:rPr lang="en-US" dirty="0"/>
+              <a:t>server.py accesses model with miner.py</a:t>
             </a:r>
           </a:p>
         </p:txBody>

</xml_diff>

<commit_message>
Presentation : minor update
</commit_message>
<xml_diff>
--- a/Tutorial Presentation - Improved ExpertSearch.pptx
+++ b/Tutorial Presentation - Improved ExpertSearch.pptx
@@ -17,8 +17,8 @@
     <p:sldId id="266" r:id="rId11"/>
     <p:sldId id="269" r:id="rId12"/>
     <p:sldId id="262" r:id="rId13"/>
-    <p:sldId id="267" r:id="rId14"/>
-    <p:sldId id="268" r:id="rId15"/>
+    <p:sldId id="268" r:id="rId14"/>
+    <p:sldId id="267" r:id="rId15"/>
     <p:sldId id="270" r:id="rId16"/>
   </p:sldIdLst>
   <p:sldSz cx="12192000" cy="6858000"/>
@@ -462,7 +462,7 @@
             <a:fld id="{5923F103-BC34-4FE4-A40E-EDDEECFDA5D0}" type="datetimeFigureOut">
               <a:rPr lang="en-US" dirty="0"/>
               <a:pPr/>
-              <a:t>12/12/2020</a:t>
+              <a:t>12/12/20</a:t>
             </a:fld>
             <a:endParaRPr lang="en-US" dirty="0"/>
           </a:p>
@@ -1546,7 +1546,7 @@
           <a:p>
             <a:fld id="{923A1CC3-2375-41D4-9E03-427CAF2A4C1A}" type="datetimeFigureOut">
               <a:rPr lang="en-US" dirty="0"/>
-              <a:t>12/12/2020</a:t>
+              <a:t>12/12/20</a:t>
             </a:fld>
             <a:endParaRPr lang="en-US" dirty="0"/>
           </a:p>
@@ -2522,7 +2522,7 @@
           <a:p>
             <a:fld id="{AFF16868-8199-4C2C-A5B1-63AEE139F88E}" type="datetimeFigureOut">
               <a:rPr lang="en-US" dirty="0"/>
-              <a:t>12/12/2020</a:t>
+              <a:t>12/12/20</a:t>
             </a:fld>
             <a:endParaRPr lang="en-US" dirty="0"/>
           </a:p>
@@ -3652,7 +3652,7 @@
           <a:p>
             <a:fld id="{AAD9FF7F-6988-44CC-821B-644E70CD2F73}" type="datetimeFigureOut">
               <a:rPr lang="en-US" dirty="0"/>
-              <a:t>12/12/2020</a:t>
+              <a:t>12/12/20</a:t>
             </a:fld>
             <a:endParaRPr lang="en-US" dirty="0"/>
           </a:p>
@@ -4681,7 +4681,7 @@
           <a:p>
             <a:fld id="{5C12C299-16B2-4475-990D-751901EACC14}" type="datetimeFigureOut">
               <a:rPr lang="en-US" dirty="0"/>
-              <a:t>12/12/2020</a:t>
+              <a:t>12/12/20</a:t>
             </a:fld>
             <a:endParaRPr lang="en-US" dirty="0"/>
           </a:p>
@@ -5337,7 +5337,7 @@
           <a:p>
             <a:fld id="{9FE86839-B9D8-4651-8783-F325ECE74E65}" type="datetimeFigureOut">
               <a:rPr lang="en-US" dirty="0"/>
-              <a:t>12/12/2020</a:t>
+              <a:t>12/12/20</a:t>
             </a:fld>
             <a:endParaRPr lang="en-US" dirty="0"/>
           </a:p>
@@ -6194,7 +6194,7 @@
           <a:p>
             <a:fld id="{FD484F64-32F6-45C5-931F-ADC1662401D0}" type="datetimeFigureOut">
               <a:rPr lang="en-US" dirty="0"/>
-              <a:t>12/12/2020</a:t>
+              <a:t>12/12/20</a:t>
             </a:fld>
             <a:endParaRPr lang="en-US" dirty="0"/>
           </a:p>
@@ -6380,7 +6380,7 @@
           <a:p>
             <a:fld id="{53086D93-FCAC-47E0-A2EE-787E62CA814C}" type="datetimeFigureOut">
               <a:rPr lang="en-US" dirty="0"/>
-              <a:t>12/12/2020</a:t>
+              <a:t>12/12/20</a:t>
             </a:fld>
             <a:endParaRPr lang="en-US" dirty="0"/>
           </a:p>
@@ -7348,7 +7348,7 @@
           <a:p>
             <a:fld id="{CDA879A6-0FD0-4734-A311-86BFCA472E6E}" type="datetimeFigureOut">
               <a:rPr lang="en-US" dirty="0"/>
-              <a:t>12/12/2020</a:t>
+              <a:t>12/12/20</a:t>
             </a:fld>
             <a:endParaRPr lang="en-US" dirty="0"/>
           </a:p>
@@ -7555,7 +7555,7 @@
           <a:p>
             <a:fld id="{19C9CA7B-DFD4-44B5-8C60-D14B8CD1FB59}" type="datetimeFigureOut">
               <a:rPr lang="en-US" dirty="0"/>
-              <a:t>12/12/2020</a:t>
+              <a:t>12/12/20</a:t>
             </a:fld>
             <a:endParaRPr lang="en-US" dirty="0"/>
           </a:p>
@@ -8585,7 +8585,7 @@
           <a:p>
             <a:fld id="{F34E6425-0181-43F2-84FC-787E803FD2F8}" type="datetimeFigureOut">
               <a:rPr lang="en-US" dirty="0"/>
-              <a:t>12/12/2020</a:t>
+              <a:t>12/12/20</a:t>
             </a:fld>
             <a:endParaRPr lang="en-US" dirty="0"/>
           </a:p>
@@ -8853,7 +8853,7 @@
           <a:p>
             <a:fld id="{3BDB8791-F1B0-41E7-B7FD-A781E65C4266}" type="datetimeFigureOut">
               <a:rPr lang="en-US" dirty="0"/>
-              <a:t>12/12/2020</a:t>
+              <a:t>12/12/20</a:t>
             </a:fld>
             <a:endParaRPr lang="en-US" dirty="0"/>
           </a:p>
@@ -9259,7 +9259,7 @@
           <a:p>
             <a:fld id="{5FDD63B2-E120-4ED8-B27B-C685F510A5FE}" type="datetimeFigureOut">
               <a:rPr lang="en-US" dirty="0"/>
-              <a:t>12/12/2020</a:t>
+              <a:t>12/12/20</a:t>
             </a:fld>
             <a:endParaRPr lang="en-US" dirty="0"/>
           </a:p>
@@ -9382,7 +9382,7 @@
           <a:p>
             <a:fld id="{7AA18ACC-A947-437B-A130-35BD54FDF1E9}" type="datetimeFigureOut">
               <a:rPr lang="en-US" dirty="0"/>
-              <a:t>12/12/2020</a:t>
+              <a:t>12/12/20</a:t>
             </a:fld>
             <a:endParaRPr lang="en-US" dirty="0"/>
           </a:p>
@@ -9473,7 +9473,7 @@
           <a:p>
             <a:fld id="{7C8D7E02-BCB8-4D50-A234-369438C08659}" type="datetimeFigureOut">
               <a:rPr lang="en-US" dirty="0"/>
-              <a:t>12/12/2020</a:t>
+              <a:t>12/12/20</a:t>
             </a:fld>
             <a:endParaRPr lang="en-US" dirty="0"/>
           </a:p>
@@ -10550,7 +10550,7 @@
           <a:p>
             <a:fld id="{76E86A4C-8E40-4F87-A4F0-01A0687C5742}" type="datetimeFigureOut">
               <a:rPr lang="en-US" dirty="0"/>
-              <a:t>12/12/2020</a:t>
+              <a:t>12/12/20</a:t>
             </a:fld>
             <a:endParaRPr lang="en-US" dirty="0"/>
           </a:p>
@@ -11654,7 +11654,7 @@
           <a:p>
             <a:fld id="{35E72C73-2D91-4E12-BA25-F0AA0C03599B}" type="datetimeFigureOut">
               <a:rPr lang="en-US" dirty="0"/>
-              <a:t>12/12/2020</a:t>
+              <a:t>12/12/20</a:t>
             </a:fld>
             <a:endParaRPr lang="en-US" dirty="0"/>
           </a:p>
@@ -12647,7 +12647,7 @@
           <a:p>
             <a:fld id="{2BE451C3-0FF4-47C4-B829-773ADF60F88C}" type="datetimeFigureOut">
               <a:rPr lang="en-US" dirty="0"/>
-              <a:t>12/12/2020</a:t>
+              <a:t>12/12/20</a:t>
             </a:fld>
             <a:endParaRPr lang="en-US" dirty="0"/>
           </a:p>
@@ -13489,15 +13489,7 @@
             <a:pPr lvl="1"/>
             <a:r>
               <a:rPr lang="en-US" b="1" dirty="0"/>
-              <a:t>$ cd </a:t>
-            </a:r>
-            <a:r>
-              <a:rPr lang="en-US" b="1" dirty="0" err="1"/>
-              <a:t>ExpertSearch</a:t>
-            </a:r>
-            <a:r>
-              <a:rPr lang="en-US" b="1" dirty="0"/>
-              <a:t>/extraction</a:t>
+              <a:t>$ cd ExpertSearch/extraction</a:t>
             </a:r>
           </a:p>
           <a:p>
@@ -13924,6 +13916,159 @@
 </file>
 
 <file path=ppt/slides/slide13.xml><?xml version="1.0" encoding="utf-8"?>
+<p:sld xmlns:a="http://schemas.openxmlformats.org/drawingml/2006/main" xmlns:r="http://schemas.openxmlformats.org/officeDocument/2006/relationships" xmlns:p="http://schemas.openxmlformats.org/presentationml/2006/main">
+  <p:cSld>
+    <p:spTree>
+      <p:nvGrpSpPr>
+        <p:cNvPr id="1" name=""/>
+        <p:cNvGrpSpPr/>
+        <p:nvPr/>
+      </p:nvGrpSpPr>
+      <p:grpSpPr>
+        <a:xfrm>
+          <a:off x="0" y="0"/>
+          <a:ext cx="0" cy="0"/>
+          <a:chOff x="0" y="0"/>
+          <a:chExt cx="0" cy="0"/>
+        </a:xfrm>
+      </p:grpSpPr>
+      <p:sp>
+        <p:nvSpPr>
+          <p:cNvPr id="2" name="Title 1">
+            <a:extLst>
+              <a:ext uri="{FF2B5EF4-FFF2-40B4-BE49-F238E27FC236}">
+                <a16:creationId xmlns:a16="http://schemas.microsoft.com/office/drawing/2014/main" id="{ADBC6A96-A791-1A4D-A787-3514D477F8F2}"/>
+              </a:ext>
+            </a:extLst>
+          </p:cNvPr>
+          <p:cNvSpPr>
+            <a:spLocks noGrp="1"/>
+          </p:cNvSpPr>
+          <p:nvPr>
+            <p:ph type="title"/>
+          </p:nvPr>
+        </p:nvSpPr>
+        <p:spPr/>
+        <p:txBody>
+          <a:bodyPr/>
+          <a:lstStyle/>
+          <a:p>
+            <a:r>
+              <a:rPr lang="en-US" dirty="0"/>
+              <a:t>Example Usage </a:t>
+            </a:r>
+            <a:r>
+              <a:rPr lang="en-US" sz="2800" dirty="0"/>
+              <a:t>(contd.)</a:t>
+            </a:r>
+          </a:p>
+        </p:txBody>
+      </p:sp>
+      <p:sp>
+        <p:nvSpPr>
+          <p:cNvPr id="5" name="TextBox 4">
+            <a:extLst>
+              <a:ext uri="{FF2B5EF4-FFF2-40B4-BE49-F238E27FC236}">
+                <a16:creationId xmlns:a16="http://schemas.microsoft.com/office/drawing/2014/main" id="{9FA32E80-C76A-B843-A9A0-FABAEBE7F1DC}"/>
+              </a:ext>
+            </a:extLst>
+          </p:cNvPr>
+          <p:cNvSpPr txBox="1"/>
+          <p:nvPr/>
+        </p:nvSpPr>
+        <p:spPr>
+          <a:xfrm>
+            <a:off x="10591800" y="130627"/>
+            <a:ext cx="396262" cy="923330"/>
+          </a:xfrm>
+          <a:prstGeom prst="rect">
+            <a:avLst/>
+          </a:prstGeom>
+          <a:noFill/>
+        </p:spPr>
+        <p:txBody>
+          <a:bodyPr wrap="none" rtlCol="0">
+            <a:spAutoFit/>
+          </a:bodyPr>
+          <a:lstStyle/>
+          <a:p>
+            <a:pPr algn="ctr"/>
+            <a:r>
+              <a:rPr lang="en-US" dirty="0">
+                <a:solidFill>
+                  <a:schemeClr val="bg1"/>
+                </a:solidFill>
+              </a:rPr>
+              <a:t>Z</a:t>
+            </a:r>
+          </a:p>
+          <a:p>
+            <a:pPr algn="ctr"/>
+            <a:r>
+              <a:rPr lang="en-US" dirty="0">
+                <a:solidFill>
+                  <a:schemeClr val="bg1"/>
+                </a:solidFill>
+              </a:rPr>
+              <a:t>M</a:t>
+            </a:r>
+          </a:p>
+          <a:p>
+            <a:pPr algn="ctr"/>
+            <a:r>
+              <a:rPr lang="en-US" dirty="0">
+                <a:solidFill>
+                  <a:schemeClr val="bg1"/>
+                </a:solidFill>
+              </a:rPr>
+              <a:t>S</a:t>
+            </a:r>
+          </a:p>
+        </p:txBody>
+      </p:sp>
+      <p:pic>
+        <p:nvPicPr>
+          <p:cNvPr id="7" name="Content Placeholder 6" descr="Graphical user interface, text, application, email&#10;&#10;Description automatically generated">
+            <a:extLst>
+              <a:ext uri="{FF2B5EF4-FFF2-40B4-BE49-F238E27FC236}">
+                <a16:creationId xmlns:a16="http://schemas.microsoft.com/office/drawing/2014/main" id="{8550333A-E9EC-D648-A835-2A97FD068D0C}"/>
+              </a:ext>
+            </a:extLst>
+          </p:cNvPr>
+          <p:cNvPicPr>
+            <a:picLocks noGrp="1" noChangeAspect="1"/>
+          </p:cNvPicPr>
+          <p:nvPr>
+            <p:ph idx="1"/>
+          </p:nvPr>
+        </p:nvPicPr>
+        <p:blipFill>
+          <a:blip r:embed="rId2"/>
+          <a:stretch>
+            <a:fillRect/>
+          </a:stretch>
+        </p:blipFill>
+        <p:spPr>
+          <a:xfrm>
+            <a:off x="2856410" y="2336482"/>
+            <a:ext cx="6479179" cy="4445318"/>
+          </a:xfrm>
+        </p:spPr>
+      </p:pic>
+    </p:spTree>
+    <p:extLst>
+      <p:ext uri="{BB962C8B-B14F-4D97-AF65-F5344CB8AC3E}">
+        <p14:creationId xmlns:p14="http://schemas.microsoft.com/office/powerpoint/2010/main" val="2941231169"/>
+      </p:ext>
+    </p:extLst>
+  </p:cSld>
+  <p:clrMapOvr>
+    <a:masterClrMapping/>
+  </p:clrMapOvr>
+</p:sld>
+</file>
+
+<file path=ppt/slides/slide14.xml><?xml version="1.0" encoding="utf-8"?>
 <p:sld xmlns:a="http://schemas.openxmlformats.org/drawingml/2006/main" xmlns:r="http://schemas.openxmlformats.org/officeDocument/2006/relationships" xmlns:p="http://schemas.openxmlformats.org/presentationml/2006/main">
   <p:cSld>
     <p:spTree>
@@ -14067,159 +14212,6 @@
     <p:extLst>
       <p:ext uri="{BB962C8B-B14F-4D97-AF65-F5344CB8AC3E}">
         <p14:creationId xmlns:p14="http://schemas.microsoft.com/office/powerpoint/2010/main" val="3901748953"/>
-      </p:ext>
-    </p:extLst>
-  </p:cSld>
-  <p:clrMapOvr>
-    <a:masterClrMapping/>
-  </p:clrMapOvr>
-</p:sld>
-</file>
-
-<file path=ppt/slides/slide14.xml><?xml version="1.0" encoding="utf-8"?>
-<p:sld xmlns:a="http://schemas.openxmlformats.org/drawingml/2006/main" xmlns:r="http://schemas.openxmlformats.org/officeDocument/2006/relationships" xmlns:p="http://schemas.openxmlformats.org/presentationml/2006/main">
-  <p:cSld>
-    <p:spTree>
-      <p:nvGrpSpPr>
-        <p:cNvPr id="1" name=""/>
-        <p:cNvGrpSpPr/>
-        <p:nvPr/>
-      </p:nvGrpSpPr>
-      <p:grpSpPr>
-        <a:xfrm>
-          <a:off x="0" y="0"/>
-          <a:ext cx="0" cy="0"/>
-          <a:chOff x="0" y="0"/>
-          <a:chExt cx="0" cy="0"/>
-        </a:xfrm>
-      </p:grpSpPr>
-      <p:sp>
-        <p:nvSpPr>
-          <p:cNvPr id="2" name="Title 1">
-            <a:extLst>
-              <a:ext uri="{FF2B5EF4-FFF2-40B4-BE49-F238E27FC236}">
-                <a16:creationId xmlns:a16="http://schemas.microsoft.com/office/drawing/2014/main" id="{ADBC6A96-A791-1A4D-A787-3514D477F8F2}"/>
-              </a:ext>
-            </a:extLst>
-          </p:cNvPr>
-          <p:cNvSpPr>
-            <a:spLocks noGrp="1"/>
-          </p:cNvSpPr>
-          <p:nvPr>
-            <p:ph type="title"/>
-          </p:nvPr>
-        </p:nvSpPr>
-        <p:spPr/>
-        <p:txBody>
-          <a:bodyPr/>
-          <a:lstStyle/>
-          <a:p>
-            <a:r>
-              <a:rPr lang="en-US" dirty="0"/>
-              <a:t>Example Usage </a:t>
-            </a:r>
-            <a:r>
-              <a:rPr lang="en-US" sz="2800" dirty="0"/>
-              <a:t>(contd.)</a:t>
-            </a:r>
-          </a:p>
-        </p:txBody>
-      </p:sp>
-      <p:sp>
-        <p:nvSpPr>
-          <p:cNvPr id="5" name="TextBox 4">
-            <a:extLst>
-              <a:ext uri="{FF2B5EF4-FFF2-40B4-BE49-F238E27FC236}">
-                <a16:creationId xmlns:a16="http://schemas.microsoft.com/office/drawing/2014/main" id="{9FA32E80-C76A-B843-A9A0-FABAEBE7F1DC}"/>
-              </a:ext>
-            </a:extLst>
-          </p:cNvPr>
-          <p:cNvSpPr txBox="1"/>
-          <p:nvPr/>
-        </p:nvSpPr>
-        <p:spPr>
-          <a:xfrm>
-            <a:off x="10591800" y="130627"/>
-            <a:ext cx="396262" cy="923330"/>
-          </a:xfrm>
-          <a:prstGeom prst="rect">
-            <a:avLst/>
-          </a:prstGeom>
-          <a:noFill/>
-        </p:spPr>
-        <p:txBody>
-          <a:bodyPr wrap="none" rtlCol="0">
-            <a:spAutoFit/>
-          </a:bodyPr>
-          <a:lstStyle/>
-          <a:p>
-            <a:pPr algn="ctr"/>
-            <a:r>
-              <a:rPr lang="en-US" dirty="0">
-                <a:solidFill>
-                  <a:schemeClr val="bg1"/>
-                </a:solidFill>
-              </a:rPr>
-              <a:t>Z</a:t>
-            </a:r>
-          </a:p>
-          <a:p>
-            <a:pPr algn="ctr"/>
-            <a:r>
-              <a:rPr lang="en-US" dirty="0">
-                <a:solidFill>
-                  <a:schemeClr val="bg1"/>
-                </a:solidFill>
-              </a:rPr>
-              <a:t>M</a:t>
-            </a:r>
-          </a:p>
-          <a:p>
-            <a:pPr algn="ctr"/>
-            <a:r>
-              <a:rPr lang="en-US" dirty="0">
-                <a:solidFill>
-                  <a:schemeClr val="bg1"/>
-                </a:solidFill>
-              </a:rPr>
-              <a:t>S</a:t>
-            </a:r>
-          </a:p>
-        </p:txBody>
-      </p:sp>
-      <p:pic>
-        <p:nvPicPr>
-          <p:cNvPr id="7" name="Content Placeholder 6" descr="Graphical user interface, text, application, email&#10;&#10;Description automatically generated">
-            <a:extLst>
-              <a:ext uri="{FF2B5EF4-FFF2-40B4-BE49-F238E27FC236}">
-                <a16:creationId xmlns:a16="http://schemas.microsoft.com/office/drawing/2014/main" id="{8550333A-E9EC-D648-A835-2A97FD068D0C}"/>
-              </a:ext>
-            </a:extLst>
-          </p:cNvPr>
-          <p:cNvPicPr>
-            <a:picLocks noGrp="1" noChangeAspect="1"/>
-          </p:cNvPicPr>
-          <p:nvPr>
-            <p:ph idx="1"/>
-          </p:nvPr>
-        </p:nvPicPr>
-        <p:blipFill>
-          <a:blip r:embed="rId2"/>
-          <a:stretch>
-            <a:fillRect/>
-          </a:stretch>
-        </p:blipFill>
-        <p:spPr>
-          <a:xfrm>
-            <a:off x="2856410" y="2336482"/>
-            <a:ext cx="6479179" cy="4445318"/>
-          </a:xfrm>
-        </p:spPr>
-      </p:pic>
-    </p:spTree>
-    <p:extLst>
-      <p:ext uri="{BB962C8B-B14F-4D97-AF65-F5344CB8AC3E}">
-        <p14:creationId xmlns:p14="http://schemas.microsoft.com/office/powerpoint/2010/main" val="2941231169"/>
       </p:ext>
     </p:extLst>
   </p:cSld>
@@ -15715,39 +15707,7 @@
             <a:pPr lvl="1"/>
             <a:r>
               <a:rPr lang="en-US" dirty="0"/>
-              <a:t>Work in </a:t>
-            </a:r>
-            <a:r>
-              <a:rPr lang="en-US" dirty="0" err="1"/>
-              <a:t>jupyter</a:t>
-            </a:r>
-            <a:r>
-              <a:rPr lang="en-US" dirty="0"/>
-              <a:t> notebook (</a:t>
-            </a:r>
-            <a:r>
-              <a:rPr lang="en-US" dirty="0" err="1"/>
-              <a:t>ExpertSearch</a:t>
-            </a:r>
-            <a:r>
-              <a:rPr lang="en-US" dirty="0"/>
-              <a:t>/data/</a:t>
-            </a:r>
-            <a:r>
-              <a:rPr lang="en-US" dirty="0" err="1"/>
-              <a:t>expertsearch</a:t>
-            </a:r>
-            <a:r>
-              <a:rPr lang="en-US" dirty="0"/>
-              <a:t>/</a:t>
-            </a:r>
-            <a:r>
-              <a:rPr lang="en-US" dirty="0" err="1"/>
-              <a:t>LDATopicModeling.ipynb</a:t>
-            </a:r>
-            <a:r>
-              <a:rPr lang="en-US" dirty="0"/>
-              <a:t>)</a:t>
+              <a:t>Work in jupyter notebook (ExpertSearch/data/expertsearch/LDATopicModeling.ipynb)</a:t>
             </a:r>
           </a:p>
           <a:p>
@@ -15774,12 +15734,8 @@
           <a:p>
             <a:pPr lvl="2"/>
             <a:r>
-              <a:rPr lang="en-US"/>
-              <a:t>Save best </a:t>
-            </a:r>
-            <a:r>
               <a:rPr lang="en-US" dirty="0"/>
-              <a:t>topic model, corpus, dictionary</a:t>
+              <a:t>Save best topic model, corpus, dictionary</a:t>
             </a:r>
           </a:p>
           <a:p>

</xml_diff>

<commit_message>
Presentation : Email extraction details
</commit_message>
<xml_diff>
--- a/Tutorial Presentation - Improved ExpertSearch.pptx
+++ b/Tutorial Presentation - Improved ExpertSearch.pptx
@@ -13498,6 +13498,27 @@
               <a:rPr lang="en-US" b="1" dirty="0"/>
               <a:t>$ python extract_email.py</a:t>
             </a:r>
+          </a:p>
+          <a:p>
+            <a:pPr lvl="1"/>
+            <a:r>
+              <a:rPr lang="en-US" b="1" dirty="0"/>
+              <a:t>Different Email Formats To Cover:</a:t>
+            </a:r>
+          </a:p>
+          <a:p>
+            <a:pPr lvl="2"/>
+            <a:r>
+              <a:rPr lang="en-US" b="1" dirty="0"/>
+              <a:t>Eugene dot agichten at emory dot edu</a:t>
+            </a:r>
+          </a:p>
+          <a:p>
+            <a:pPr lvl="2"/>
+            <a:r>
+              <a:rPr lang="en-US" b="1" dirty="0"/>
+              <a:t>Rohini [@] buffalo [DOT] edu</a:t>
+            </a:r>
             <a:endParaRPr lang="en-US" dirty="0"/>
           </a:p>
           <a:p>

</xml_diff>